<commit_message>
Change to window mode from full screen mode
</commit_message>
<xml_diff>
--- a/version_control_git.pptx
+++ b/version_control_git.pptx
@@ -404,7 +404,7 @@
           <a:p>
             <a:fld id="{11D3E7B2-0861-45F0-B59E-BA867D5C805D}" type="datetimeFigureOut">
               <a:rPr lang="nl-BE" smtClean="0"/>
-              <a:t>24/10/2020</a:t>
+              <a:t>27/10/2020</a:t>
             </a:fld>
             <a:endParaRPr lang="nl-BE"/>
           </a:p>
@@ -1105,7 +1105,7 @@
           <a:p>
             <a:fld id="{208C4982-2142-4DAC-808C-52C1A6ABA40A}" type="datetime1">
               <a:rPr lang="nl-BE" smtClean="0"/>
-              <a:t>24/10/2020</a:t>
+              <a:t>27/10/2020</a:t>
             </a:fld>
             <a:endParaRPr lang="nl-BE"/>
           </a:p>
@@ -1275,7 +1275,7 @@
           <a:p>
             <a:fld id="{596A4774-AA95-4CEA-9215-BE91EC5FD3A2}" type="datetime1">
               <a:rPr lang="nl-BE" smtClean="0"/>
-              <a:t>24/10/2020</a:t>
+              <a:t>27/10/2020</a:t>
             </a:fld>
             <a:endParaRPr lang="nl-BE"/>
           </a:p>
@@ -1455,7 +1455,7 @@
           <a:p>
             <a:fld id="{E3C938DE-9D5A-4A9D-B2A9-9053FBBA636A}" type="datetime1">
               <a:rPr lang="nl-BE" smtClean="0"/>
-              <a:t>24/10/2020</a:t>
+              <a:t>27/10/2020</a:t>
             </a:fld>
             <a:endParaRPr lang="nl-BE"/>
           </a:p>
@@ -1625,7 +1625,7 @@
           <a:p>
             <a:fld id="{70B73439-F632-4142-A813-39A8890A9414}" type="datetime1">
               <a:rPr lang="nl-BE" smtClean="0"/>
-              <a:t>24/10/2020</a:t>
+              <a:t>27/10/2020</a:t>
             </a:fld>
             <a:endParaRPr lang="nl-BE"/>
           </a:p>
@@ -1871,7 +1871,7 @@
           <a:p>
             <a:fld id="{2DA105E3-7574-4472-893A-A0C7A919BAE6}" type="datetime1">
               <a:rPr lang="nl-BE" smtClean="0"/>
-              <a:t>24/10/2020</a:t>
+              <a:t>27/10/2020</a:t>
             </a:fld>
             <a:endParaRPr lang="nl-BE"/>
           </a:p>
@@ -2159,7 +2159,7 @@
           <a:p>
             <a:fld id="{184B200F-AF61-4171-AE34-7A4B12E0FBA3}" type="datetime1">
               <a:rPr lang="nl-BE" smtClean="0"/>
-              <a:t>24/10/2020</a:t>
+              <a:t>27/10/2020</a:t>
             </a:fld>
             <a:endParaRPr lang="nl-BE"/>
           </a:p>
@@ -2581,7 +2581,7 @@
           <a:p>
             <a:fld id="{4DDD3743-DAF8-4465-AEC2-93735E02B3D0}" type="datetime1">
               <a:rPr lang="nl-BE" smtClean="0"/>
-              <a:t>24/10/2020</a:t>
+              <a:t>27/10/2020</a:t>
             </a:fld>
             <a:endParaRPr lang="nl-BE"/>
           </a:p>
@@ -2699,7 +2699,7 @@
           <a:p>
             <a:fld id="{0E48E2E9-C147-459B-ACCB-D6DDC51735D3}" type="datetime1">
               <a:rPr lang="nl-BE" smtClean="0"/>
-              <a:t>24/10/2020</a:t>
+              <a:t>27/10/2020</a:t>
             </a:fld>
             <a:endParaRPr lang="nl-BE"/>
           </a:p>
@@ -2794,7 +2794,7 @@
           <a:p>
             <a:fld id="{C92A24F5-0967-4B11-849A-0009476290B5}" type="datetime1">
               <a:rPr lang="nl-BE" smtClean="0"/>
-              <a:t>24/10/2020</a:t>
+              <a:t>27/10/2020</a:t>
             </a:fld>
             <a:endParaRPr lang="nl-BE"/>
           </a:p>
@@ -3071,7 +3071,7 @@
           <a:p>
             <a:fld id="{CAAB6B0C-E333-4316-A6EC-161EFC5CB4BD}" type="datetime1">
               <a:rPr lang="nl-BE" smtClean="0"/>
-              <a:t>24/10/2020</a:t>
+              <a:t>27/10/2020</a:t>
             </a:fld>
             <a:endParaRPr lang="nl-BE"/>
           </a:p>
@@ -3324,7 +3324,7 @@
           <a:p>
             <a:fld id="{5AC2428B-24E8-4004-8AB4-EA69DDAD1475}" type="datetime1">
               <a:rPr lang="nl-BE" smtClean="0"/>
-              <a:t>24/10/2020</a:t>
+              <a:t>27/10/2020</a:t>
             </a:fld>
             <a:endParaRPr lang="nl-BE"/>
           </a:p>
@@ -3537,7 +3537,7 @@
           <a:p>
             <a:fld id="{063E4CA3-87AF-44C9-B256-93720A95DFC3}" type="datetime1">
               <a:rPr lang="nl-BE" smtClean="0"/>
-              <a:t>24/10/2020</a:t>
+              <a:t>27/10/2020</a:t>
             </a:fld>
             <a:endParaRPr lang="nl-BE"/>
           </a:p>

</xml_diff>

<commit_message>
Change master to main branch
* Both Github and Gitlab now use `main` rather than `master` by default.
</commit_message>
<xml_diff>
--- a/version_control_git.pptx
+++ b/version_control_git.pptx
@@ -404,7 +404,7 @@
           <a:p>
             <a:fld id="{11D3E7B2-0861-45F0-B59E-BA867D5C805D}" type="datetimeFigureOut">
               <a:rPr lang="nl-BE" smtClean="0"/>
-              <a:t>27/10/2020</a:t>
+              <a:t>8/11/2021</a:t>
             </a:fld>
             <a:endParaRPr lang="nl-BE"/>
           </a:p>
@@ -1105,7 +1105,7 @@
           <a:p>
             <a:fld id="{208C4982-2142-4DAC-808C-52C1A6ABA40A}" type="datetime1">
               <a:rPr lang="nl-BE" smtClean="0"/>
-              <a:t>27/10/2020</a:t>
+              <a:t>8/11/2021</a:t>
             </a:fld>
             <a:endParaRPr lang="nl-BE"/>
           </a:p>
@@ -1275,7 +1275,7 @@
           <a:p>
             <a:fld id="{596A4774-AA95-4CEA-9215-BE91EC5FD3A2}" type="datetime1">
               <a:rPr lang="nl-BE" smtClean="0"/>
-              <a:t>27/10/2020</a:t>
+              <a:t>8/11/2021</a:t>
             </a:fld>
             <a:endParaRPr lang="nl-BE"/>
           </a:p>
@@ -1455,7 +1455,7 @@
           <a:p>
             <a:fld id="{E3C938DE-9D5A-4A9D-B2A9-9053FBBA636A}" type="datetime1">
               <a:rPr lang="nl-BE" smtClean="0"/>
-              <a:t>27/10/2020</a:t>
+              <a:t>8/11/2021</a:t>
             </a:fld>
             <a:endParaRPr lang="nl-BE"/>
           </a:p>
@@ -1625,7 +1625,7 @@
           <a:p>
             <a:fld id="{70B73439-F632-4142-A813-39A8890A9414}" type="datetime1">
               <a:rPr lang="nl-BE" smtClean="0"/>
-              <a:t>27/10/2020</a:t>
+              <a:t>8/11/2021</a:t>
             </a:fld>
             <a:endParaRPr lang="nl-BE"/>
           </a:p>
@@ -1871,7 +1871,7 @@
           <a:p>
             <a:fld id="{2DA105E3-7574-4472-893A-A0C7A919BAE6}" type="datetime1">
               <a:rPr lang="nl-BE" smtClean="0"/>
-              <a:t>27/10/2020</a:t>
+              <a:t>8/11/2021</a:t>
             </a:fld>
             <a:endParaRPr lang="nl-BE"/>
           </a:p>
@@ -2159,7 +2159,7 @@
           <a:p>
             <a:fld id="{184B200F-AF61-4171-AE34-7A4B12E0FBA3}" type="datetime1">
               <a:rPr lang="nl-BE" smtClean="0"/>
-              <a:t>27/10/2020</a:t>
+              <a:t>8/11/2021</a:t>
             </a:fld>
             <a:endParaRPr lang="nl-BE"/>
           </a:p>
@@ -2581,7 +2581,7 @@
           <a:p>
             <a:fld id="{4DDD3743-DAF8-4465-AEC2-93735E02B3D0}" type="datetime1">
               <a:rPr lang="nl-BE" smtClean="0"/>
-              <a:t>27/10/2020</a:t>
+              <a:t>8/11/2021</a:t>
             </a:fld>
             <a:endParaRPr lang="nl-BE"/>
           </a:p>
@@ -2699,7 +2699,7 @@
           <a:p>
             <a:fld id="{0E48E2E9-C147-459B-ACCB-D6DDC51735D3}" type="datetime1">
               <a:rPr lang="nl-BE" smtClean="0"/>
-              <a:t>27/10/2020</a:t>
+              <a:t>8/11/2021</a:t>
             </a:fld>
             <a:endParaRPr lang="nl-BE"/>
           </a:p>
@@ -2794,7 +2794,7 @@
           <a:p>
             <a:fld id="{C92A24F5-0967-4B11-849A-0009476290B5}" type="datetime1">
               <a:rPr lang="nl-BE" smtClean="0"/>
-              <a:t>27/10/2020</a:t>
+              <a:t>8/11/2021</a:t>
             </a:fld>
             <a:endParaRPr lang="nl-BE"/>
           </a:p>
@@ -3071,7 +3071,7 @@
           <a:p>
             <a:fld id="{CAAB6B0C-E333-4316-A6EC-161EFC5CB4BD}" type="datetime1">
               <a:rPr lang="nl-BE" smtClean="0"/>
-              <a:t>27/10/2020</a:t>
+              <a:t>8/11/2021</a:t>
             </a:fld>
             <a:endParaRPr lang="nl-BE"/>
           </a:p>
@@ -3324,7 +3324,7 @@
           <a:p>
             <a:fld id="{5AC2428B-24E8-4004-8AB4-EA69DDAD1475}" type="datetime1">
               <a:rPr lang="nl-BE" smtClean="0"/>
-              <a:t>27/10/2020</a:t>
+              <a:t>8/11/2021</a:t>
             </a:fld>
             <a:endParaRPr lang="nl-BE"/>
           </a:p>
@@ -3537,7 +3537,7 @@
           <a:p>
             <a:fld id="{063E4CA3-87AF-44C9-B256-93720A95DFC3}" type="datetime1">
               <a:rPr lang="nl-BE" smtClean="0"/>
-              <a:t>27/10/2020</a:t>
+              <a:t>8/11/2021</a:t>
             </a:fld>
             <a:endParaRPr lang="nl-BE"/>
           </a:p>
@@ -11485,7 +11485,7 @@
                 <a:latin typeface="Courier New" panose="02070309020205020404" pitchFamily="49" charset="0"/>
                 <a:cs typeface="Courier New" panose="02070309020205020404" pitchFamily="49" charset="0"/>
               </a:rPr>
-              <a:t>On branch master</a:t>
+              <a:t>On branch main</a:t>
             </a:r>
           </a:p>
           <a:p>
@@ -14954,7 +14954,7 @@
                 <a:latin typeface="Courier New" panose="02070309020205020404" pitchFamily="49" charset="0"/>
                 <a:cs typeface="Courier New" panose="02070309020205020404" pitchFamily="49" charset="0"/>
               </a:rPr>
-              <a:t>769cdd7 (HEAD -&gt; master) Introduced square function</a:t>
+              <a:t>769cdd7 (HEAD -&gt; main) Introduced square function</a:t>
             </a:r>
           </a:p>
           <a:p>
@@ -19780,7 +19780,7 @@
             <a:pPr lvl="1"/>
             <a:r>
               <a:rPr lang="en-US" dirty="0"/>
-              <a:t>Don't commit stuff in master that doesn't work (i.e., that doesn't compile without errors) when working in team</a:t>
+              <a:t>Don't commit stuff in main that doesn't work (i.e., that doesn't compile without errors) when working in team</a:t>
             </a:r>
           </a:p>
           <a:p>
@@ -26137,7 +26137,7 @@
         <p:spPr>
           <a:xfrm>
             <a:off x="1259632" y="1988840"/>
-            <a:ext cx="3768980" cy="369332"/>
+            <a:ext cx="3493264" cy="369332"/>
           </a:xfrm>
           <a:prstGeom prst="rect">
             <a:avLst/>
@@ -26179,8 +26179,19 @@
                 <a:latin typeface="Courier New" pitchFamily="49" charset="0"/>
                 <a:cs typeface="Courier New" pitchFamily="49" charset="0"/>
               </a:rPr>
-              <a:t>  master</a:t>
-            </a:r>
+              <a:t>  </a:t>
+            </a:r>
+            <a:r>
+              <a:rPr lang="nl-BE" dirty="0" err="1">
+                <a:latin typeface="Courier New" pitchFamily="49" charset="0"/>
+                <a:cs typeface="Courier New" pitchFamily="49" charset="0"/>
+              </a:rPr>
+              <a:t>main</a:t>
+            </a:r>
+            <a:endParaRPr lang="nl-BE" dirty="0">
+              <a:latin typeface="Courier New" pitchFamily="49" charset="0"/>
+              <a:cs typeface="Courier New" pitchFamily="49" charset="0"/>
+            </a:endParaRPr>
           </a:p>
         </p:txBody>
       </p:sp>
@@ -26295,7 +26306,7 @@
         <p:spPr>
           <a:xfrm>
             <a:off x="1259632" y="3717032"/>
-            <a:ext cx="3768980" cy="369332"/>
+            <a:ext cx="3493264" cy="369332"/>
           </a:xfrm>
           <a:prstGeom prst="rect">
             <a:avLst/>
@@ -26337,8 +26348,19 @@
                 <a:latin typeface="Courier New" pitchFamily="49" charset="0"/>
                 <a:cs typeface="Courier New" pitchFamily="49" charset="0"/>
               </a:rPr>
-              <a:t>  master</a:t>
-            </a:r>
+              <a:t>  </a:t>
+            </a:r>
+            <a:r>
+              <a:rPr lang="nl-BE" dirty="0" err="1">
+                <a:latin typeface="Courier New" pitchFamily="49" charset="0"/>
+                <a:cs typeface="Courier New" pitchFamily="49" charset="0"/>
+              </a:rPr>
+              <a:t>main</a:t>
+            </a:r>
+            <a:endParaRPr lang="nl-BE" dirty="0">
+              <a:latin typeface="Courier New" pitchFamily="49" charset="0"/>
+              <a:cs typeface="Courier New" pitchFamily="49" charset="0"/>
+            </a:endParaRPr>
           </a:p>
         </p:txBody>
       </p:sp>
@@ -26351,7 +26373,7 @@
         <p:spPr>
           <a:xfrm>
             <a:off x="1259632" y="6011996"/>
-            <a:ext cx="3768980" cy="369332"/>
+            <a:ext cx="3493264" cy="369332"/>
           </a:xfrm>
           <a:prstGeom prst="rect">
             <a:avLst/>
@@ -26393,8 +26415,19 @@
                 <a:latin typeface="Courier New" pitchFamily="49" charset="0"/>
                 <a:cs typeface="Courier New" pitchFamily="49" charset="0"/>
               </a:rPr>
-              <a:t>  master</a:t>
-            </a:r>
+              <a:t>  </a:t>
+            </a:r>
+            <a:r>
+              <a:rPr lang="nl-BE" dirty="0" err="1">
+                <a:latin typeface="Courier New" pitchFamily="49" charset="0"/>
+                <a:cs typeface="Courier New" pitchFamily="49" charset="0"/>
+              </a:rPr>
+              <a:t>main</a:t>
+            </a:r>
+            <a:endParaRPr lang="nl-BE" dirty="0">
+              <a:latin typeface="Courier New" pitchFamily="49" charset="0"/>
+              <a:cs typeface="Courier New" pitchFamily="49" charset="0"/>
+            </a:endParaRPr>
           </a:p>
         </p:txBody>
       </p:sp>
@@ -29611,7 +29644,7 @@
                 <a:latin typeface="Courier New" pitchFamily="49" charset="0"/>
                 <a:cs typeface="Courier New" pitchFamily="49" charset="0"/>
               </a:rPr>
-              <a:t>&gt;&gt;&gt;&gt;&gt;&gt;&gt; master</a:t>
+              <a:t>&gt;&gt;&gt;&gt;&gt;&gt;&gt; main</a:t>
             </a:r>
           </a:p>
           <a:p>
@@ -30999,7 +31032,7 @@
             </a:r>
             <a:r>
               <a:rPr lang="en-US" dirty="0"/>
-              <a:t> from master</a:t>
+              <a:t> from main</a:t>
             </a:r>
           </a:p>
           <a:p>
@@ -31025,7 +31058,7 @@
             </a:r>
             <a:r>
               <a:rPr lang="en-US" dirty="0"/>
-              <a:t> from master</a:t>
+              <a:t> from main</a:t>
             </a:r>
           </a:p>
           <a:p>
@@ -31051,7 +31084,7 @@
             </a:r>
             <a:r>
               <a:rPr lang="en-US" dirty="0"/>
-              <a:t> back into master</a:t>
+              <a:t> back into main</a:t>
             </a:r>
             <a:endParaRPr lang="en-US" i="1" dirty="0"/>
           </a:p>
@@ -31078,7 +31111,7 @@
             </a:r>
             <a:r>
               <a:rPr lang="en-US" dirty="0"/>
-              <a:t> back into master</a:t>
+              <a:t> back into main</a:t>
             </a:r>
           </a:p>
         </p:txBody>
@@ -31240,9 +31273,9 @@
         <p:grpSpPr>
           <a:xfrm>
             <a:off x="1179651" y="4869160"/>
-            <a:ext cx="915379" cy="377796"/>
+            <a:ext cx="880453" cy="377796"/>
             <a:chOff x="883235" y="6219556"/>
-            <a:chExt cx="915379" cy="377796"/>
+            <a:chExt cx="880453" cy="377796"/>
           </a:xfrm>
         </p:grpSpPr>
         <p:sp>
@@ -31300,7 +31333,7 @@
           <p:spPr>
             <a:xfrm>
               <a:off x="883235" y="6219556"/>
-              <a:ext cx="915379" cy="369332"/>
+              <a:ext cx="732893" cy="369332"/>
             </a:xfrm>
             <a:prstGeom prst="rect">
               <a:avLst/>
@@ -31315,7 +31348,7 @@
             <a:p>
               <a:r>
                 <a:rPr lang="en-US" dirty="0"/>
-                <a:t>master</a:t>
+                <a:t>main</a:t>
               </a:r>
               <a:r>
                 <a:rPr lang="en-US" baseline="-25000" dirty="0"/>
@@ -31481,10 +31514,10 @@
         </p:nvGrpSpPr>
         <p:grpSpPr>
           <a:xfrm>
-            <a:off x="1637340" y="5238492"/>
-            <a:ext cx="1206468" cy="638780"/>
-            <a:chOff x="1637340" y="5238492"/>
-            <a:chExt cx="1206468" cy="638780"/>
+            <a:off x="1546098" y="5238492"/>
+            <a:ext cx="1297710" cy="638780"/>
+            <a:chOff x="1546098" y="5238492"/>
+            <a:chExt cx="1297710" cy="638780"/>
           </a:xfrm>
         </p:grpSpPr>
         <p:grpSp>
@@ -31592,8 +31625,8 @@
           </p:nvCxnSpPr>
           <p:spPr>
             <a:xfrm rot="16200000" flipH="1">
-              <a:off x="1579146" y="5296686"/>
-              <a:ext cx="458760" cy="342371"/>
+              <a:off x="1533525" y="5251065"/>
+              <a:ext cx="458760" cy="433614"/>
             </a:xfrm>
             <a:prstGeom prst="bentConnector2">
               <a:avLst/>
@@ -32000,7 +32033,7 @@
             <p:spPr>
               <a:xfrm>
                 <a:off x="848309" y="6219556"/>
-                <a:ext cx="915379" cy="369332"/>
+                <a:ext cx="732893" cy="369332"/>
               </a:xfrm>
               <a:prstGeom prst="rect">
                 <a:avLst/>
@@ -32015,7 +32048,7 @@
               <a:p>
                 <a:r>
                   <a:rPr lang="en-US" dirty="0"/>
-                  <a:t>master</a:t>
+                  <a:t>main</a:t>
                 </a:r>
                 <a:r>
                   <a:rPr lang="en-US" baseline="-25000" dirty="0"/>
@@ -32077,7 +32110,7 @@
           <p:spPr>
             <a:xfrm flipV="1">
               <a:off x="5796136" y="5238492"/>
-              <a:ext cx="190383" cy="1106832"/>
+              <a:ext cx="99140" cy="1106832"/>
             </a:xfrm>
             <a:prstGeom prst="bentConnector2">
               <a:avLst/>
@@ -32113,10 +32146,10 @@
         </p:nvGrpSpPr>
         <p:grpSpPr>
           <a:xfrm>
-            <a:off x="6444208" y="4869160"/>
-            <a:ext cx="1495868" cy="828092"/>
-            <a:chOff x="6444208" y="4869160"/>
-            <a:chExt cx="1495868" cy="828092"/>
+            <a:off x="6261722" y="4869160"/>
+            <a:ext cx="1622646" cy="828092"/>
+            <a:chOff x="6261722" y="4869160"/>
+            <a:chExt cx="1622646" cy="828092"/>
           </a:xfrm>
         </p:grpSpPr>
         <p:grpSp>
@@ -32128,9 +32161,9 @@
           <p:grpSpPr>
             <a:xfrm>
               <a:off x="7020272" y="4869160"/>
-              <a:ext cx="919804" cy="377796"/>
+              <a:ext cx="864096" cy="377796"/>
               <a:chOff x="899592" y="6219556"/>
-              <a:chExt cx="919804" cy="377796"/>
+              <a:chExt cx="864096" cy="377796"/>
             </a:xfrm>
           </p:grpSpPr>
           <p:sp>
@@ -32188,7 +32221,7 @@
             <p:spPr>
               <a:xfrm>
                 <a:off x="904017" y="6219556"/>
-                <a:ext cx="915379" cy="369332"/>
+                <a:ext cx="732893" cy="369332"/>
               </a:xfrm>
               <a:prstGeom prst="rect">
                 <a:avLst/>
@@ -32203,7 +32236,7 @@
               <a:p>
                 <a:r>
                   <a:rPr lang="en-US" dirty="0"/>
-                  <a:t>master</a:t>
+                  <a:t>main</a:t>
                 </a:r>
                 <a:r>
                   <a:rPr lang="en-US" baseline="-25000" dirty="0"/>
@@ -32224,8 +32257,8 @@
           </p:nvCxnSpPr>
           <p:spPr>
             <a:xfrm>
-              <a:off x="6444208" y="5053826"/>
-              <a:ext cx="576064" cy="13110"/>
+              <a:off x="6261722" y="5053826"/>
+              <a:ext cx="758550" cy="13110"/>
             </a:xfrm>
             <a:prstGeom prst="straightConnector1">
               <a:avLst/>
@@ -34452,7 +34485,7 @@
             </a:pPr>
             <a:r>
               <a:rPr lang="en-US" dirty="0"/>
-              <a:t>Switch back to master branch</a:t>
+              <a:t>Switch back to main branch</a:t>
             </a:r>
           </a:p>
           <a:p>
@@ -34469,7 +34502,7 @@
             </a:pPr>
             <a:r>
               <a:rPr lang="en-US" dirty="0"/>
-              <a:t>Merge branch into master</a:t>
+              <a:t>Merge branch into main</a:t>
             </a:r>
           </a:p>
           <a:p>
@@ -34547,8 +34580,19 @@
                 <a:latin typeface="Courier New" pitchFamily="49" charset="0"/>
                 <a:cs typeface="Courier New" pitchFamily="49" charset="0"/>
               </a:rPr>
-              <a:t>  master</a:t>
-            </a:r>
+              <a:t>  </a:t>
+            </a:r>
+            <a:r>
+              <a:rPr lang="nl-BE" dirty="0" err="1">
+                <a:latin typeface="Courier New" pitchFamily="49" charset="0"/>
+                <a:cs typeface="Courier New" pitchFamily="49" charset="0"/>
+              </a:rPr>
+              <a:t>main</a:t>
+            </a:r>
+            <a:endParaRPr lang="nl-BE" dirty="0">
+              <a:latin typeface="Courier New" pitchFamily="49" charset="0"/>
+              <a:cs typeface="Courier New" pitchFamily="49" charset="0"/>
+            </a:endParaRPr>
           </a:p>
         </p:txBody>
       </p:sp>
@@ -35704,7 +35748,7 @@
             <a:pPr lvl="2"/>
             <a:r>
               <a:rPr lang="en-US" dirty="0"/>
-              <a:t>master</a:t>
+              <a:t>main</a:t>
             </a:r>
           </a:p>
           <a:p>
@@ -38954,7 +38998,21 @@
                 <a:latin typeface="Courier New" pitchFamily="49" charset="0"/>
                 <a:cs typeface="Courier New" pitchFamily="49" charset="0"/>
               </a:rPr>
-              <a:t>*   889d71a (HEAD -&gt; master) Add bye application</a:t>
+              <a:t>*   889d71a (HEAD -&gt; </a:t>
+            </a:r>
+            <a:r>
+              <a:rPr lang="nl-BE" dirty="0" err="1">
+                <a:latin typeface="Courier New" pitchFamily="49" charset="0"/>
+                <a:cs typeface="Courier New" pitchFamily="49" charset="0"/>
+              </a:rPr>
+              <a:t>main</a:t>
+            </a:r>
+            <a:r>
+              <a:rPr lang="nl-BE" dirty="0">
+                <a:latin typeface="Courier New" pitchFamily="49" charset="0"/>
+                <a:cs typeface="Courier New" pitchFamily="49" charset="0"/>
+              </a:rPr>
+              <a:t>) Add bye application</a:t>
             </a:r>
           </a:p>
           <a:p>
@@ -39206,9 +39264,9 @@
         <p:grpSpPr>
           <a:xfrm>
             <a:off x="6002207" y="4437112"/>
-            <a:ext cx="2997778" cy="747554"/>
+            <a:ext cx="2752903" cy="747554"/>
             <a:chOff x="6012160" y="4653135"/>
-            <a:chExt cx="2997778" cy="747554"/>
+            <a:chExt cx="2752903" cy="747554"/>
           </a:xfrm>
         </p:grpSpPr>
         <p:grpSp>
@@ -39220,9 +39278,9 @@
           <p:grpSpPr>
             <a:xfrm>
               <a:off x="6228184" y="4939024"/>
-              <a:ext cx="2781754" cy="461665"/>
+              <a:ext cx="2536879" cy="461665"/>
               <a:chOff x="5290202" y="2132856"/>
-              <a:chExt cx="2781754" cy="461665"/>
+              <a:chExt cx="2536879" cy="461665"/>
             </a:xfrm>
           </p:grpSpPr>
           <p:cxnSp>
@@ -39272,7 +39330,7 @@
             <p:spPr>
               <a:xfrm>
                 <a:off x="6084168" y="2132856"/>
-                <a:ext cx="1987788" cy="461665"/>
+                <a:ext cx="1742913" cy="461665"/>
               </a:xfrm>
               <a:prstGeom prst="rect">
                 <a:avLst/>
@@ -39294,7 +39352,7 @@
               <a:p>
                 <a:r>
                   <a:rPr lang="en-US" sz="2400" dirty="0"/>
-                  <a:t>master branch</a:t>
+                  <a:t>main branch</a:t>
                 </a:r>
                 <a:endParaRPr lang="nl-BE" sz="2400" dirty="0"/>
               </a:p>
@@ -39793,7 +39851,21 @@
                 <a:latin typeface="Courier New" pitchFamily="49" charset="0"/>
                 <a:cs typeface="Courier New" pitchFamily="49" charset="0"/>
               </a:rPr>
-              <a:t>*   889d71a (master) Add bye application</a:t>
+              <a:t>*   889d71a (</a:t>
+            </a:r>
+            <a:r>
+              <a:rPr lang="nl-BE" dirty="0" err="1">
+                <a:latin typeface="Courier New" pitchFamily="49" charset="0"/>
+                <a:cs typeface="Courier New" pitchFamily="49" charset="0"/>
+              </a:rPr>
+              <a:t>main</a:t>
+            </a:r>
+            <a:r>
+              <a:rPr lang="nl-BE" dirty="0">
+                <a:latin typeface="Courier New" pitchFamily="49" charset="0"/>
+                <a:cs typeface="Courier New" pitchFamily="49" charset="0"/>
+              </a:rPr>
+              <a:t>) Add bye application</a:t>
             </a:r>
           </a:p>
           <a:p>
@@ -41737,7 +41809,7 @@
                 <a:latin typeface="Courier New" panose="02070309020205020404" pitchFamily="49" charset="0"/>
                 <a:cs typeface="Courier New" panose="02070309020205020404" pitchFamily="49" charset="0"/>
               </a:rPr>
-              <a:t>master</a:t>
+              <a:t>main</a:t>
             </a:r>
           </a:p>
           <a:p>
@@ -41827,7 +41899,28 @@
                 <a:latin typeface="Courier New" pitchFamily="49" charset="0"/>
                 <a:cs typeface="Courier New" pitchFamily="49" charset="0"/>
               </a:rPr>
-              <a:t>$ git diff  master</a:t>
+              <a:t>$ git </a:t>
+            </a:r>
+            <a:r>
+              <a:rPr lang="nl-BE" dirty="0" err="1">
+                <a:latin typeface="Courier New" pitchFamily="49" charset="0"/>
+                <a:cs typeface="Courier New" pitchFamily="49" charset="0"/>
+              </a:rPr>
+              <a:t>diff</a:t>
+            </a:r>
+            <a:r>
+              <a:rPr lang="nl-BE" dirty="0">
+                <a:latin typeface="Courier New" pitchFamily="49" charset="0"/>
+                <a:cs typeface="Courier New" pitchFamily="49" charset="0"/>
+              </a:rPr>
+              <a:t>  </a:t>
+            </a:r>
+            <a:r>
+              <a:rPr lang="nl-BE" dirty="0" err="1">
+                <a:latin typeface="Courier New" pitchFamily="49" charset="0"/>
+                <a:cs typeface="Courier New" pitchFamily="49" charset="0"/>
+              </a:rPr>
+              <a:t>main</a:t>
             </a:r>
             <a:endParaRPr lang="nl-BE" b="1" dirty="0">
               <a:solidFill>
@@ -41871,7 +41964,28 @@
                 <a:latin typeface="Courier New" pitchFamily="49" charset="0"/>
                 <a:cs typeface="Courier New" pitchFamily="49" charset="0"/>
               </a:rPr>
-              <a:t>$ git diff  --name-only  master</a:t>
+              <a:t>$ git diff  --name-</a:t>
+            </a:r>
+            <a:r>
+              <a:rPr lang="nl-BE" dirty="0" err="1">
+                <a:latin typeface="Courier New" pitchFamily="49" charset="0"/>
+                <a:cs typeface="Courier New" pitchFamily="49" charset="0"/>
+              </a:rPr>
+              <a:t>only</a:t>
+            </a:r>
+            <a:r>
+              <a:rPr lang="nl-BE" dirty="0">
+                <a:latin typeface="Courier New" pitchFamily="49" charset="0"/>
+                <a:cs typeface="Courier New" pitchFamily="49" charset="0"/>
+              </a:rPr>
+              <a:t>  </a:t>
+            </a:r>
+            <a:r>
+              <a:rPr lang="nl-BE" dirty="0" err="1">
+                <a:latin typeface="Courier New" pitchFamily="49" charset="0"/>
+                <a:cs typeface="Courier New" pitchFamily="49" charset="0"/>
+              </a:rPr>
+              <a:t>main</a:t>
             </a:r>
             <a:endParaRPr lang="nl-BE" b="1" dirty="0">
               <a:solidFill>
@@ -41915,7 +42029,28 @@
                 <a:latin typeface="Courier New" pitchFamily="49" charset="0"/>
                 <a:cs typeface="Courier New" pitchFamily="49" charset="0"/>
               </a:rPr>
-              <a:t>$ git diff  --  eq.c  master:eq.c</a:t>
+              <a:t>$ git diff  --  </a:t>
+            </a:r>
+            <a:r>
+              <a:rPr lang="nl-BE" dirty="0" err="1">
+                <a:latin typeface="Courier New" pitchFamily="49" charset="0"/>
+                <a:cs typeface="Courier New" pitchFamily="49" charset="0"/>
+              </a:rPr>
+              <a:t>eq.c</a:t>
+            </a:r>
+            <a:r>
+              <a:rPr lang="nl-BE" dirty="0">
+                <a:latin typeface="Courier New" pitchFamily="49" charset="0"/>
+                <a:cs typeface="Courier New" pitchFamily="49" charset="0"/>
+              </a:rPr>
+              <a:t>  </a:t>
+            </a:r>
+            <a:r>
+              <a:rPr lang="nl-BE" dirty="0" err="1">
+                <a:latin typeface="Courier New" pitchFamily="49" charset="0"/>
+                <a:cs typeface="Courier New" pitchFamily="49" charset="0"/>
+              </a:rPr>
+              <a:t>main:eq.c</a:t>
             </a:r>
             <a:endParaRPr lang="nl-BE" b="1" dirty="0">
               <a:solidFill>
@@ -44501,7 +44636,21 @@
                 <a:latin typeface="Courier New" pitchFamily="49" charset="0"/>
                 <a:cs typeface="Courier New" pitchFamily="49" charset="0"/>
               </a:rPr>
-              <a:t>  master  |  </a:t>
+              <a:t>  </a:t>
+            </a:r>
+            <a:r>
+              <a:rPr lang="nl-BE" dirty="0" err="1">
+                <a:latin typeface="Courier New" pitchFamily="49" charset="0"/>
+                <a:cs typeface="Courier New" pitchFamily="49" charset="0"/>
+              </a:rPr>
+              <a:t>main</a:t>
+            </a:r>
+            <a:r>
+              <a:rPr lang="nl-BE" dirty="0">
+                <a:latin typeface="Courier New" pitchFamily="49" charset="0"/>
+                <a:cs typeface="Courier New" pitchFamily="49" charset="0"/>
+              </a:rPr>
+              <a:t>  |  </a:t>
             </a:r>
             <a:r>
               <a:rPr lang="nl-BE" dirty="0" err="1">
@@ -44566,7 +44715,21 @@
                 <a:latin typeface="Courier New" pitchFamily="49" charset="0"/>
                 <a:cs typeface="Courier New" pitchFamily="49" charset="0"/>
               </a:rPr>
-              <a:t>  --format=zip  master  &gt;  ~/my_project.zip</a:t>
+              <a:t>  --format=zip  </a:t>
+            </a:r>
+            <a:r>
+              <a:rPr lang="nl-BE" dirty="0" err="1">
+                <a:latin typeface="Courier New" pitchFamily="49" charset="0"/>
+                <a:cs typeface="Courier New" pitchFamily="49" charset="0"/>
+              </a:rPr>
+              <a:t>main</a:t>
+            </a:r>
+            <a:r>
+              <a:rPr lang="nl-BE" dirty="0">
+                <a:latin typeface="Courier New" pitchFamily="49" charset="0"/>
+                <a:cs typeface="Courier New" pitchFamily="49" charset="0"/>
+              </a:rPr>
+              <a:t>  &gt;  ~/my_project.zip</a:t>
             </a:r>
           </a:p>
         </p:txBody>
@@ -46658,7 +46821,7 @@
                 <a:latin typeface="Courier New" panose="02070309020205020404" pitchFamily="49" charset="0"/>
                 <a:cs typeface="Courier New" panose="02070309020205020404" pitchFamily="49" charset="0"/>
               </a:rPr>
-              <a:t>master</a:t>
+              <a:t>main</a:t>
             </a:r>
           </a:p>
         </p:txBody>
@@ -47656,7 +47819,7 @@
             <a:pPr lvl="1"/>
             <a:r>
               <a:rPr lang="en-US" dirty="0"/>
-              <a:t>If okay, merge remote branch into, e.g., master or development</a:t>
+              <a:t>If okay, merge remote branch into, e.g., main or development</a:t>
             </a:r>
           </a:p>
           <a:p>

</xml_diff>

<commit_message>
Fix fonts for branch names
</commit_message>
<xml_diff>
--- a/version_control_git.pptx
+++ b/version_control_git.pptx
@@ -404,7 +404,7 @@
           <a:p>
             <a:fld id="{11D3E7B2-0861-45F0-B59E-BA867D5C805D}" type="datetimeFigureOut">
               <a:rPr lang="nl-BE" smtClean="0"/>
-              <a:t>8/11/2021</a:t>
+              <a:t>15/11/2021</a:t>
             </a:fld>
             <a:endParaRPr lang="nl-BE"/>
           </a:p>
@@ -1105,7 +1105,7 @@
           <a:p>
             <a:fld id="{208C4982-2142-4DAC-808C-52C1A6ABA40A}" type="datetime1">
               <a:rPr lang="nl-BE" smtClean="0"/>
-              <a:t>8/11/2021</a:t>
+              <a:t>15/11/2021</a:t>
             </a:fld>
             <a:endParaRPr lang="nl-BE"/>
           </a:p>
@@ -1275,7 +1275,7 @@
           <a:p>
             <a:fld id="{596A4774-AA95-4CEA-9215-BE91EC5FD3A2}" type="datetime1">
               <a:rPr lang="nl-BE" smtClean="0"/>
-              <a:t>8/11/2021</a:t>
+              <a:t>15/11/2021</a:t>
             </a:fld>
             <a:endParaRPr lang="nl-BE"/>
           </a:p>
@@ -1455,7 +1455,7 @@
           <a:p>
             <a:fld id="{E3C938DE-9D5A-4A9D-B2A9-9053FBBA636A}" type="datetime1">
               <a:rPr lang="nl-BE" smtClean="0"/>
-              <a:t>8/11/2021</a:t>
+              <a:t>15/11/2021</a:t>
             </a:fld>
             <a:endParaRPr lang="nl-BE"/>
           </a:p>
@@ -1625,7 +1625,7 @@
           <a:p>
             <a:fld id="{70B73439-F632-4142-A813-39A8890A9414}" type="datetime1">
               <a:rPr lang="nl-BE" smtClean="0"/>
-              <a:t>8/11/2021</a:t>
+              <a:t>15/11/2021</a:t>
             </a:fld>
             <a:endParaRPr lang="nl-BE"/>
           </a:p>
@@ -1871,7 +1871,7 @@
           <a:p>
             <a:fld id="{2DA105E3-7574-4472-893A-A0C7A919BAE6}" type="datetime1">
               <a:rPr lang="nl-BE" smtClean="0"/>
-              <a:t>8/11/2021</a:t>
+              <a:t>15/11/2021</a:t>
             </a:fld>
             <a:endParaRPr lang="nl-BE"/>
           </a:p>
@@ -2159,7 +2159,7 @@
           <a:p>
             <a:fld id="{184B200F-AF61-4171-AE34-7A4B12E0FBA3}" type="datetime1">
               <a:rPr lang="nl-BE" smtClean="0"/>
-              <a:t>8/11/2021</a:t>
+              <a:t>15/11/2021</a:t>
             </a:fld>
             <a:endParaRPr lang="nl-BE"/>
           </a:p>
@@ -2581,7 +2581,7 @@
           <a:p>
             <a:fld id="{4DDD3743-DAF8-4465-AEC2-93735E02B3D0}" type="datetime1">
               <a:rPr lang="nl-BE" smtClean="0"/>
-              <a:t>8/11/2021</a:t>
+              <a:t>15/11/2021</a:t>
             </a:fld>
             <a:endParaRPr lang="nl-BE"/>
           </a:p>
@@ -2699,7 +2699,7 @@
           <a:p>
             <a:fld id="{0E48E2E9-C147-459B-ACCB-D6DDC51735D3}" type="datetime1">
               <a:rPr lang="nl-BE" smtClean="0"/>
-              <a:t>8/11/2021</a:t>
+              <a:t>15/11/2021</a:t>
             </a:fld>
             <a:endParaRPr lang="nl-BE"/>
           </a:p>
@@ -2794,7 +2794,7 @@
           <a:p>
             <a:fld id="{C92A24F5-0967-4B11-849A-0009476290B5}" type="datetime1">
               <a:rPr lang="nl-BE" smtClean="0"/>
-              <a:t>8/11/2021</a:t>
+              <a:t>15/11/2021</a:t>
             </a:fld>
             <a:endParaRPr lang="nl-BE"/>
           </a:p>
@@ -3071,7 +3071,7 @@
           <a:p>
             <a:fld id="{CAAB6B0C-E333-4316-A6EC-161EFC5CB4BD}" type="datetime1">
               <a:rPr lang="nl-BE" smtClean="0"/>
-              <a:t>8/11/2021</a:t>
+              <a:t>15/11/2021</a:t>
             </a:fld>
             <a:endParaRPr lang="nl-BE"/>
           </a:p>
@@ -3324,7 +3324,7 @@
           <a:p>
             <a:fld id="{5AC2428B-24E8-4004-8AB4-EA69DDAD1475}" type="datetime1">
               <a:rPr lang="nl-BE" smtClean="0"/>
-              <a:t>8/11/2021</a:t>
+              <a:t>15/11/2021</a:t>
             </a:fld>
             <a:endParaRPr lang="nl-BE"/>
           </a:p>
@@ -3537,7 +3537,7 @@
           <a:p>
             <a:fld id="{063E4CA3-87AF-44C9-B256-93720A95DFC3}" type="datetime1">
               <a:rPr lang="nl-BE" smtClean="0"/>
-              <a:t>8/11/2021</a:t>
+              <a:t>15/11/2021</a:t>
             </a:fld>
             <a:endParaRPr lang="nl-BE"/>
           </a:p>
@@ -19780,7 +19780,18 @@
             <a:pPr lvl="1"/>
             <a:r>
               <a:rPr lang="en-US" dirty="0"/>
-              <a:t>Don't commit stuff in main that doesn't work (i.e., that doesn't compile without errors) when working in team</a:t>
+              <a:t>Don't commit stuff in </a:t>
+            </a:r>
+            <a:r>
+              <a:rPr lang="en-US" dirty="0">
+                <a:latin typeface="Courier New" panose="02070309020205020404" pitchFamily="49" charset="0"/>
+                <a:cs typeface="Courier New" panose="02070309020205020404" pitchFamily="49" charset="0"/>
+              </a:rPr>
+              <a:t>main</a:t>
+            </a:r>
+            <a:r>
+              <a:rPr lang="en-US" dirty="0"/>
+              <a:t> that doesn't work (i.e., that doesn't compile without errors) when working in team</a:t>
             </a:r>
           </a:p>
           <a:p>
@@ -31032,7 +31043,14 @@
             </a:r>
             <a:r>
               <a:rPr lang="en-US" dirty="0"/>
-              <a:t> from main</a:t>
+              <a:t> from </a:t>
+            </a:r>
+            <a:r>
+              <a:rPr lang="en-US" dirty="0">
+                <a:latin typeface="Courier New" panose="02070309020205020404" pitchFamily="49" charset="0"/>
+                <a:cs typeface="Courier New" panose="02070309020205020404" pitchFamily="49" charset="0"/>
+              </a:rPr>
+              <a:t>main</a:t>
             </a:r>
           </a:p>
           <a:p>
@@ -31058,7 +31076,14 @@
             </a:r>
             <a:r>
               <a:rPr lang="en-US" dirty="0"/>
-              <a:t> from main</a:t>
+              <a:t> from </a:t>
+            </a:r>
+            <a:r>
+              <a:rPr lang="en-US" dirty="0">
+                <a:latin typeface="Courier New" panose="02070309020205020404" pitchFamily="49" charset="0"/>
+                <a:cs typeface="Courier New" panose="02070309020205020404" pitchFamily="49" charset="0"/>
+              </a:rPr>
+              <a:t>main</a:t>
             </a:r>
           </a:p>
           <a:p>
@@ -31084,9 +31109,19 @@
             </a:r>
             <a:r>
               <a:rPr lang="en-US" dirty="0"/>
-              <a:t> back into main</a:t>
-            </a:r>
-            <a:endParaRPr lang="en-US" i="1" dirty="0"/>
+              <a:t> back into </a:t>
+            </a:r>
+            <a:r>
+              <a:rPr lang="en-US" dirty="0">
+                <a:latin typeface="Courier New" panose="02070309020205020404" pitchFamily="49" charset="0"/>
+                <a:cs typeface="Courier New" panose="02070309020205020404" pitchFamily="49" charset="0"/>
+              </a:rPr>
+              <a:t>main</a:t>
+            </a:r>
+            <a:endParaRPr lang="en-US" i="1" dirty="0">
+              <a:latin typeface="Courier New" panose="02070309020205020404" pitchFamily="49" charset="0"/>
+              <a:cs typeface="Courier New" panose="02070309020205020404" pitchFamily="49" charset="0"/>
+            </a:endParaRPr>
           </a:p>
           <a:p>
             <a:pPr lvl="1"/>
@@ -31111,7 +31146,14 @@
             </a:r>
             <a:r>
               <a:rPr lang="en-US" dirty="0"/>
-              <a:t> back into main</a:t>
+              <a:t> back into </a:t>
+            </a:r>
+            <a:r>
+              <a:rPr lang="en-US" dirty="0">
+                <a:latin typeface="Courier New" panose="02070309020205020404" pitchFamily="49" charset="0"/>
+                <a:cs typeface="Courier New" panose="02070309020205020404" pitchFamily="49" charset="0"/>
+              </a:rPr>
+              <a:t>main</a:t>
             </a:r>
           </a:p>
         </p:txBody>
@@ -34485,7 +34527,18 @@
             </a:pPr>
             <a:r>
               <a:rPr lang="en-US" dirty="0"/>
-              <a:t>Switch back to main branch</a:t>
+              <a:t>Switch back to </a:t>
+            </a:r>
+            <a:r>
+              <a:rPr lang="en-US" dirty="0">
+                <a:latin typeface="Courier New" panose="02070309020205020404" pitchFamily="49" charset="0"/>
+                <a:cs typeface="Courier New" panose="02070309020205020404" pitchFamily="49" charset="0"/>
+              </a:rPr>
+              <a:t>main</a:t>
+            </a:r>
+            <a:r>
+              <a:rPr lang="en-US" dirty="0"/>
+              <a:t> branch</a:t>
             </a:r>
           </a:p>
           <a:p>
@@ -34502,7 +34555,14 @@
             </a:pPr>
             <a:r>
               <a:rPr lang="en-US" dirty="0"/>
-              <a:t>Merge branch into main</a:t>
+              <a:t>Merge branch into </a:t>
+            </a:r>
+            <a:r>
+              <a:rPr lang="en-US" dirty="0">
+                <a:latin typeface="Courier New" panose="02070309020205020404" pitchFamily="49" charset="0"/>
+                <a:cs typeface="Courier New" panose="02070309020205020404" pitchFamily="49" charset="0"/>
+              </a:rPr>
+              <a:t>main</a:t>
             </a:r>
           </a:p>
           <a:p>
@@ -35747,7 +35807,10 @@
           <a:p>
             <a:pPr lvl="2"/>
             <a:r>
-              <a:rPr lang="en-US" dirty="0"/>
+              <a:rPr lang="en-US" dirty="0">
+                <a:latin typeface="Courier New" panose="02070309020205020404" pitchFamily="49" charset="0"/>
+                <a:cs typeface="Courier New" panose="02070309020205020404" pitchFamily="49" charset="0"/>
+              </a:rPr>
               <a:t>main</a:t>
             </a:r>
           </a:p>
@@ -35761,37 +35824,61 @@
           <a:p>
             <a:pPr lvl="3"/>
             <a:r>
-              <a:rPr lang="en-US" dirty="0"/>
+              <a:rPr lang="en-US" dirty="0">
+                <a:latin typeface="Courier New" panose="02070309020205020404" pitchFamily="49" charset="0"/>
+                <a:cs typeface="Courier New" panose="02070309020205020404" pitchFamily="49" charset="0"/>
+              </a:rPr>
               <a:t>development</a:t>
             </a:r>
           </a:p>
           <a:p>
             <a:pPr lvl="3"/>
             <a:r>
-              <a:rPr lang="en-US" dirty="0"/>
+              <a:rPr lang="en-US" dirty="0">
+                <a:latin typeface="Courier New" panose="02070309020205020404" pitchFamily="49" charset="0"/>
+                <a:cs typeface="Courier New" panose="02070309020205020404" pitchFamily="49" charset="0"/>
+              </a:rPr>
               <a:t>feature/</a:t>
             </a:r>
             <a:r>
-              <a:rPr lang="en-US" dirty="0" err="1"/>
+              <a:rPr lang="en-US" dirty="0" err="1">
+                <a:latin typeface="Courier New" panose="02070309020205020404" pitchFamily="49" charset="0"/>
+                <a:cs typeface="Courier New" panose="02070309020205020404" pitchFamily="49" charset="0"/>
+              </a:rPr>
               <a:t>gradient_descent</a:t>
             </a:r>
-            <a:endParaRPr lang="en-US" dirty="0"/>
+            <a:endParaRPr lang="en-US" dirty="0">
+              <a:latin typeface="Courier New" panose="02070309020205020404" pitchFamily="49" charset="0"/>
+              <a:cs typeface="Courier New" panose="02070309020205020404" pitchFamily="49" charset="0"/>
+            </a:endParaRPr>
           </a:p>
           <a:p>
             <a:pPr lvl="3"/>
             <a:r>
-              <a:rPr lang="en-US" dirty="0" err="1"/>
+              <a:rPr lang="en-US" dirty="0" err="1">
+                <a:latin typeface="Courier New" panose="02070309020205020404" pitchFamily="49" charset="0"/>
+                <a:cs typeface="Courier New" panose="02070309020205020404" pitchFamily="49" charset="0"/>
+              </a:rPr>
               <a:t>bugfix</a:t>
             </a:r>
             <a:r>
-              <a:rPr lang="en-US" dirty="0"/>
+              <a:rPr lang="en-US" dirty="0">
+                <a:latin typeface="Courier New" panose="02070309020205020404" pitchFamily="49" charset="0"/>
+                <a:cs typeface="Courier New" panose="02070309020205020404" pitchFamily="49" charset="0"/>
+              </a:rPr>
               <a:t>/</a:t>
             </a:r>
             <a:r>
-              <a:rPr lang="en-US" dirty="0" err="1"/>
+              <a:rPr lang="en-US" dirty="0" err="1">
+                <a:latin typeface="Courier New" panose="02070309020205020404" pitchFamily="49" charset="0"/>
+                <a:cs typeface="Courier New" panose="02070309020205020404" pitchFamily="49" charset="0"/>
+              </a:rPr>
               <a:t>memory_leak</a:t>
             </a:r>
-            <a:endParaRPr lang="en-US" dirty="0"/>
+            <a:endParaRPr lang="en-US" dirty="0">
+              <a:latin typeface="Courier New" panose="02070309020205020404" pitchFamily="49" charset="0"/>
+              <a:cs typeface="Courier New" panose="02070309020205020404" pitchFamily="49" charset="0"/>
+            </a:endParaRPr>
           </a:p>
           <a:p>
             <a:pPr lvl="3"/>
@@ -36265,7 +36352,7 @@
         </p:nvGrpSpPr>
         <p:grpSpPr>
           <a:xfrm>
-            <a:off x="5819162" y="3275692"/>
+            <a:off x="6588224" y="3275692"/>
             <a:ext cx="1584176" cy="369332"/>
             <a:chOff x="5819162" y="3275692"/>
             <a:chExt cx="1584176" cy="369332"/>
@@ -39264,9 +39351,9 @@
         <p:grpSpPr>
           <a:xfrm>
             <a:off x="6002207" y="4437112"/>
-            <a:ext cx="2752903" cy="747554"/>
+            <a:ext cx="2865113" cy="747554"/>
             <a:chOff x="6012160" y="4653135"/>
-            <a:chExt cx="2752903" cy="747554"/>
+            <a:chExt cx="2865113" cy="747554"/>
           </a:xfrm>
         </p:grpSpPr>
         <p:grpSp>
@@ -39278,9 +39365,9 @@
           <p:grpSpPr>
             <a:xfrm>
               <a:off x="6228184" y="4939024"/>
-              <a:ext cx="2536879" cy="461665"/>
+              <a:ext cx="2649089" cy="461665"/>
               <a:chOff x="5290202" y="2132856"/>
-              <a:chExt cx="2536879" cy="461665"/>
+              <a:chExt cx="2649089" cy="461665"/>
             </a:xfrm>
           </p:grpSpPr>
           <p:cxnSp>
@@ -39330,7 +39417,7 @@
             <p:spPr>
               <a:xfrm>
                 <a:off x="6084168" y="2132856"/>
-                <a:ext cx="1742913" cy="461665"/>
+                <a:ext cx="1855123" cy="461665"/>
               </a:xfrm>
               <a:prstGeom prst="rect">
                 <a:avLst/>
@@ -39351,8 +39438,15 @@
               <a:lstStyle/>
               <a:p>
                 <a:r>
+                  <a:rPr lang="en-US" sz="2400" dirty="0">
+                    <a:latin typeface="Courier New" panose="02070309020205020404" pitchFamily="49" charset="0"/>
+                    <a:cs typeface="Courier New" panose="02070309020205020404" pitchFamily="49" charset="0"/>
+                  </a:rPr>
+                  <a:t>main</a:t>
+                </a:r>
+                <a:r>
                   <a:rPr lang="en-US" sz="2400" dirty="0"/>
-                  <a:t>main branch</a:t>
+                  <a:t> branch</a:t>
                 </a:r>
                 <a:endParaRPr lang="nl-BE" sz="2400" dirty="0"/>
               </a:p>
@@ -47819,7 +47913,25 @@
             <a:pPr lvl="1"/>
             <a:r>
               <a:rPr lang="en-US" dirty="0"/>
-              <a:t>If okay, merge remote branch into, e.g., main or development</a:t>
+              <a:t>If okay, merge remote branch into, e.g., </a:t>
+            </a:r>
+            <a:r>
+              <a:rPr lang="en-US" dirty="0">
+                <a:latin typeface="Courier New" panose="02070309020205020404" pitchFamily="49" charset="0"/>
+                <a:cs typeface="Courier New" panose="02070309020205020404" pitchFamily="49" charset="0"/>
+              </a:rPr>
+              <a:t>main</a:t>
+            </a:r>
+            <a:r>
+              <a:rPr lang="en-US" dirty="0"/>
+              <a:t> or </a:t>
+            </a:r>
+            <a:r>
+              <a:rPr lang="en-US" dirty="0">
+                <a:latin typeface="Courier New" panose="02070309020205020404" pitchFamily="49" charset="0"/>
+                <a:cs typeface="Courier New" panose="02070309020205020404" pitchFamily="49" charset="0"/>
+              </a:rPr>
+              <a:t>development</a:t>
             </a:r>
           </a:p>
           <a:p>

</xml_diff>

<commit_message>
Add URL to humorous commit messages
</commit_message>
<xml_diff>
--- a/version_control_git.pptx
+++ b/version_control_git.pptx
@@ -404,7 +404,7 @@
           <a:p>
             <a:fld id="{11D3E7B2-0861-45F0-B59E-BA867D5C805D}" type="datetimeFigureOut">
               <a:rPr lang="nl-BE" smtClean="0"/>
-              <a:t>15/11/2021</a:t>
+              <a:t>3/12/2021</a:t>
             </a:fld>
             <a:endParaRPr lang="nl-BE"/>
           </a:p>
@@ -1105,7 +1105,7 @@
           <a:p>
             <a:fld id="{208C4982-2142-4DAC-808C-52C1A6ABA40A}" type="datetime1">
               <a:rPr lang="nl-BE" smtClean="0"/>
-              <a:t>15/11/2021</a:t>
+              <a:t>3/12/2021</a:t>
             </a:fld>
             <a:endParaRPr lang="nl-BE"/>
           </a:p>
@@ -1275,7 +1275,7 @@
           <a:p>
             <a:fld id="{596A4774-AA95-4CEA-9215-BE91EC5FD3A2}" type="datetime1">
               <a:rPr lang="nl-BE" smtClean="0"/>
-              <a:t>15/11/2021</a:t>
+              <a:t>3/12/2021</a:t>
             </a:fld>
             <a:endParaRPr lang="nl-BE"/>
           </a:p>
@@ -1455,7 +1455,7 @@
           <a:p>
             <a:fld id="{E3C938DE-9D5A-4A9D-B2A9-9053FBBA636A}" type="datetime1">
               <a:rPr lang="nl-BE" smtClean="0"/>
-              <a:t>15/11/2021</a:t>
+              <a:t>3/12/2021</a:t>
             </a:fld>
             <a:endParaRPr lang="nl-BE"/>
           </a:p>
@@ -1625,7 +1625,7 @@
           <a:p>
             <a:fld id="{70B73439-F632-4142-A813-39A8890A9414}" type="datetime1">
               <a:rPr lang="nl-BE" smtClean="0"/>
-              <a:t>15/11/2021</a:t>
+              <a:t>3/12/2021</a:t>
             </a:fld>
             <a:endParaRPr lang="nl-BE"/>
           </a:p>
@@ -1871,7 +1871,7 @@
           <a:p>
             <a:fld id="{2DA105E3-7574-4472-893A-A0C7A919BAE6}" type="datetime1">
               <a:rPr lang="nl-BE" smtClean="0"/>
-              <a:t>15/11/2021</a:t>
+              <a:t>3/12/2021</a:t>
             </a:fld>
             <a:endParaRPr lang="nl-BE"/>
           </a:p>
@@ -2159,7 +2159,7 @@
           <a:p>
             <a:fld id="{184B200F-AF61-4171-AE34-7A4B12E0FBA3}" type="datetime1">
               <a:rPr lang="nl-BE" smtClean="0"/>
-              <a:t>15/11/2021</a:t>
+              <a:t>3/12/2021</a:t>
             </a:fld>
             <a:endParaRPr lang="nl-BE"/>
           </a:p>
@@ -2581,7 +2581,7 @@
           <a:p>
             <a:fld id="{4DDD3743-DAF8-4465-AEC2-93735E02B3D0}" type="datetime1">
               <a:rPr lang="nl-BE" smtClean="0"/>
-              <a:t>15/11/2021</a:t>
+              <a:t>3/12/2021</a:t>
             </a:fld>
             <a:endParaRPr lang="nl-BE"/>
           </a:p>
@@ -2699,7 +2699,7 @@
           <a:p>
             <a:fld id="{0E48E2E9-C147-459B-ACCB-D6DDC51735D3}" type="datetime1">
               <a:rPr lang="nl-BE" smtClean="0"/>
-              <a:t>15/11/2021</a:t>
+              <a:t>3/12/2021</a:t>
             </a:fld>
             <a:endParaRPr lang="nl-BE"/>
           </a:p>
@@ -2794,7 +2794,7 @@
           <a:p>
             <a:fld id="{C92A24F5-0967-4B11-849A-0009476290B5}" type="datetime1">
               <a:rPr lang="nl-BE" smtClean="0"/>
-              <a:t>15/11/2021</a:t>
+              <a:t>3/12/2021</a:t>
             </a:fld>
             <a:endParaRPr lang="nl-BE"/>
           </a:p>
@@ -3071,7 +3071,7 @@
           <a:p>
             <a:fld id="{CAAB6B0C-E333-4316-A6EC-161EFC5CB4BD}" type="datetime1">
               <a:rPr lang="nl-BE" smtClean="0"/>
-              <a:t>15/11/2021</a:t>
+              <a:t>3/12/2021</a:t>
             </a:fld>
             <a:endParaRPr lang="nl-BE"/>
           </a:p>
@@ -3324,7 +3324,7 @@
           <a:p>
             <a:fld id="{5AC2428B-24E8-4004-8AB4-EA69DDAD1475}" type="datetime1">
               <a:rPr lang="nl-BE" smtClean="0"/>
-              <a:t>15/11/2021</a:t>
+              <a:t>3/12/2021</a:t>
             </a:fld>
             <a:endParaRPr lang="nl-BE"/>
           </a:p>
@@ -3537,7 +3537,7 @@
           <a:p>
             <a:fld id="{063E4CA3-87AF-44C9-B256-93720A95DFC3}" type="datetime1">
               <a:rPr lang="nl-BE" smtClean="0"/>
-              <a:t>15/11/2021</a:t>
+              <a:t>3/12/2021</a:t>
             </a:fld>
             <a:endParaRPr lang="nl-BE"/>
           </a:p>
@@ -11438,8 +11438,8 @@
         </p:nvSpPr>
         <p:spPr>
           <a:xfrm>
-            <a:off x="1214206" y="2276872"/>
-            <a:ext cx="6526146" cy="3416320"/>
+            <a:off x="107504" y="2134011"/>
+            <a:ext cx="8948283" cy="3785652"/>
           </a:xfrm>
           <a:prstGeom prst="rect">
             <a:avLst/>
@@ -11458,45 +11458,31 @@
           <a:lstStyle/>
           <a:p>
             <a:r>
-              <a:rPr lang="en-US" dirty="0">
+              <a:rPr lang="en-US" sz="1600" dirty="0">
                 <a:latin typeface="Courier New" panose="02070309020205020404" pitchFamily="49" charset="0"/>
                 <a:cs typeface="Courier New" panose="02070309020205020404" pitchFamily="49" charset="0"/>
               </a:rPr>
-              <a:t>$ </a:t>
-            </a:r>
-            <a:r>
-              <a:rPr lang="en-US" dirty="0" err="1">
+              <a:t>$ git status</a:t>
+            </a:r>
+          </a:p>
+          <a:p>
+            <a:r>
+              <a:rPr lang="en-US" sz="1600" dirty="0">
                 <a:latin typeface="Courier New" panose="02070309020205020404" pitchFamily="49" charset="0"/>
                 <a:cs typeface="Courier New" panose="02070309020205020404" pitchFamily="49" charset="0"/>
               </a:rPr>
-              <a:t>git</a:t>
-            </a:r>
-            <a:r>
-              <a:rPr lang="en-US" dirty="0">
-                <a:latin typeface="Courier New" panose="02070309020205020404" pitchFamily="49" charset="0"/>
-                <a:cs typeface="Courier New" panose="02070309020205020404" pitchFamily="49" charset="0"/>
-              </a:rPr>
-              <a:t> status</a:t>
-            </a:r>
-          </a:p>
-          <a:p>
-            <a:r>
-              <a:rPr lang="en-US" dirty="0">
-                <a:latin typeface="Courier New" panose="02070309020205020404" pitchFamily="49" charset="0"/>
-                <a:cs typeface="Courier New" panose="02070309020205020404" pitchFamily="49" charset="0"/>
-              </a:rPr>
               <a:t>On branch main</a:t>
             </a:r>
           </a:p>
           <a:p>
-            <a:endParaRPr lang="en-US" dirty="0">
+            <a:endParaRPr lang="en-US" sz="1600" dirty="0">
               <a:latin typeface="Courier New" panose="02070309020205020404" pitchFamily="49" charset="0"/>
               <a:cs typeface="Courier New" panose="02070309020205020404" pitchFamily="49" charset="0"/>
             </a:endParaRPr>
           </a:p>
           <a:p>
             <a:r>
-              <a:rPr lang="en-US" dirty="0">
+              <a:rPr lang="en-US" sz="1600" dirty="0">
                 <a:latin typeface="Courier New" panose="02070309020205020404" pitchFamily="49" charset="0"/>
                 <a:cs typeface="Courier New" panose="02070309020205020404" pitchFamily="49" charset="0"/>
               </a:rPr>
@@ -11505,93 +11491,98 @@
           </a:p>
           <a:p>
             <a:r>
-              <a:rPr lang="en-US" dirty="0">
+              <a:rPr lang="en-US" sz="1600" dirty="0">
                 <a:latin typeface="Courier New" panose="02070309020205020404" pitchFamily="49" charset="0"/>
                 <a:cs typeface="Courier New" panose="02070309020205020404" pitchFamily="49" charset="0"/>
               </a:rPr>
-              <a:t>  (use "</a:t>
-            </a:r>
-            <a:r>
-              <a:rPr lang="en-US" dirty="0" err="1">
+              <a:t>  (use "git restore --staged &lt;file&gt;..." to </a:t>
+            </a:r>
+            <a:r>
+              <a:rPr lang="en-US" sz="1600" dirty="0" err="1">
                 <a:latin typeface="Courier New" panose="02070309020205020404" pitchFamily="49" charset="0"/>
                 <a:cs typeface="Courier New" panose="02070309020205020404" pitchFamily="49" charset="0"/>
               </a:rPr>
-              <a:t>git</a:t>
-            </a:r>
-            <a:r>
-              <a:rPr lang="en-US" dirty="0">
+              <a:t>unstage</a:t>
+            </a:r>
+            <a:r>
+              <a:rPr lang="en-US" sz="1600" dirty="0">
                 <a:latin typeface="Courier New" panose="02070309020205020404" pitchFamily="49" charset="0"/>
                 <a:cs typeface="Courier New" panose="02070309020205020404" pitchFamily="49" charset="0"/>
               </a:rPr>
-              <a:t> </a:t>
-            </a:r>
-            <a:r>
-              <a:rPr lang="en-US" dirty="0" err="1">
+              <a:t>)</a:t>
+            </a:r>
+          </a:p>
+          <a:p>
+            <a:r>
+              <a:rPr lang="en-US" sz="1600" dirty="0">
                 <a:latin typeface="Courier New" panose="02070309020205020404" pitchFamily="49" charset="0"/>
                 <a:cs typeface="Courier New" panose="02070309020205020404" pitchFamily="49" charset="0"/>
               </a:rPr>
-              <a:t>rm</a:t>
-            </a:r>
-            <a:r>
-              <a:rPr lang="en-US" dirty="0">
-                <a:latin typeface="Courier New" panose="02070309020205020404" pitchFamily="49" charset="0"/>
-                <a:cs typeface="Courier New" panose="02070309020205020404" pitchFamily="49" charset="0"/>
-              </a:rPr>
-              <a:t> --cached &lt;file&gt;..." to </a:t>
-            </a:r>
-            <a:r>
-              <a:rPr lang="en-US" dirty="0" err="1">
-                <a:latin typeface="Courier New" panose="02070309020205020404" pitchFamily="49" charset="0"/>
-                <a:cs typeface="Courier New" panose="02070309020205020404" pitchFamily="49" charset="0"/>
-              </a:rPr>
-              <a:t>unstage</a:t>
-            </a:r>
-            <a:r>
-              <a:rPr lang="en-US" dirty="0">
-                <a:latin typeface="Courier New" panose="02070309020205020404" pitchFamily="49" charset="0"/>
-                <a:cs typeface="Courier New" panose="02070309020205020404" pitchFamily="49" charset="0"/>
-              </a:rPr>
-              <a:t>)</a:t>
-            </a:r>
-          </a:p>
-          <a:p>
-            <a:r>
-              <a:rPr lang="en-US" dirty="0">
-                <a:latin typeface="Courier New" panose="02070309020205020404" pitchFamily="49" charset="0"/>
-                <a:cs typeface="Courier New" panose="02070309020205020404" pitchFamily="49" charset="0"/>
-              </a:rPr>
-              <a:t>	new file:   README.md</a:t>
-            </a:r>
-          </a:p>
-          <a:p>
-            <a:r>
-              <a:rPr lang="en-US" dirty="0">
-                <a:latin typeface="Courier New" panose="02070309020205020404" pitchFamily="49" charset="0"/>
-                <a:cs typeface="Courier New" panose="02070309020205020404" pitchFamily="49" charset="0"/>
-              </a:rPr>
-              <a:t>	new file:   </a:t>
-            </a:r>
-            <a:r>
-              <a:rPr lang="en-US" dirty="0" err="1">
-                <a:latin typeface="Courier New" panose="02070309020205020404" pitchFamily="49" charset="0"/>
-                <a:cs typeface="Courier New" panose="02070309020205020404" pitchFamily="49" charset="0"/>
-              </a:rPr>
-              <a:t>eq.c</a:t>
-            </a:r>
-            <a:endParaRPr lang="en-US" dirty="0">
+              <a:t>        new file:   TODO.md</a:t>
+            </a:r>
+          </a:p>
+          <a:p>
+            <a:endParaRPr lang="en-US" sz="1600" dirty="0">
               <a:latin typeface="Courier New" panose="02070309020205020404" pitchFamily="49" charset="0"/>
               <a:cs typeface="Courier New" panose="02070309020205020404" pitchFamily="49" charset="0"/>
             </a:endParaRPr>
           </a:p>
           <a:p>
-            <a:endParaRPr lang="en-US" dirty="0">
+            <a:r>
+              <a:rPr lang="en-US" sz="1600" dirty="0">
+                <a:latin typeface="Courier New" panose="02070309020205020404" pitchFamily="49" charset="0"/>
+                <a:cs typeface="Courier New" panose="02070309020205020404" pitchFamily="49" charset="0"/>
+              </a:rPr>
+              <a:t>Changes not staged for commit:</a:t>
+            </a:r>
+          </a:p>
+          <a:p>
+            <a:r>
+              <a:rPr lang="en-US" sz="1600" dirty="0">
+                <a:latin typeface="Courier New" panose="02070309020205020404" pitchFamily="49" charset="0"/>
+                <a:cs typeface="Courier New" panose="02070309020205020404" pitchFamily="49" charset="0"/>
+              </a:rPr>
+              <a:t>  (use "git add &lt;file&gt;..." to update what will be committed)</a:t>
+            </a:r>
+          </a:p>
+          <a:p>
+            <a:r>
+              <a:rPr lang="en-US" sz="1600" dirty="0">
+                <a:latin typeface="Courier New" panose="02070309020205020404" pitchFamily="49" charset="0"/>
+                <a:cs typeface="Courier New" panose="02070309020205020404" pitchFamily="49" charset="0"/>
+              </a:rPr>
+              <a:t>  (use "git restore &lt;file&gt;..." to discard changes in working directory)</a:t>
+            </a:r>
+          </a:p>
+          <a:p>
+            <a:r>
+              <a:rPr lang="en-US" sz="1600" dirty="0">
+                <a:latin typeface="Courier New" panose="02070309020205020404" pitchFamily="49" charset="0"/>
+                <a:cs typeface="Courier New" panose="02070309020205020404" pitchFamily="49" charset="0"/>
+              </a:rPr>
+              <a:t>        modified:   </a:t>
+            </a:r>
+            <a:r>
+              <a:rPr lang="en-US" sz="1600" dirty="0" err="1">
+                <a:latin typeface="Courier New" panose="02070309020205020404" pitchFamily="49" charset="0"/>
+                <a:cs typeface="Courier New" panose="02070309020205020404" pitchFamily="49" charset="0"/>
+              </a:rPr>
+              <a:t>eq.c</a:t>
+            </a:r>
+            <a:endParaRPr lang="en-US" sz="1600" dirty="0">
               <a:latin typeface="Courier New" panose="02070309020205020404" pitchFamily="49" charset="0"/>
               <a:cs typeface="Courier New" panose="02070309020205020404" pitchFamily="49" charset="0"/>
             </a:endParaRPr>
           </a:p>
           <a:p>
-            <a:r>
-              <a:rPr lang="en-US" dirty="0">
+            <a:endParaRPr lang="en-US" sz="1600" dirty="0">
+              <a:latin typeface="Courier New" panose="02070309020205020404" pitchFamily="49" charset="0"/>
+              <a:cs typeface="Courier New" panose="02070309020205020404" pitchFamily="49" charset="0"/>
+            </a:endParaRPr>
+          </a:p>
+          <a:p>
+            <a:r>
+              <a:rPr lang="en-US" sz="1600" dirty="0">
                 <a:latin typeface="Courier New" panose="02070309020205020404" pitchFamily="49" charset="0"/>
                 <a:cs typeface="Courier New" panose="02070309020205020404" pitchFamily="49" charset="0"/>
               </a:rPr>
@@ -11600,47 +11591,20 @@
           </a:p>
           <a:p>
             <a:r>
-              <a:rPr lang="en-US" dirty="0">
+              <a:rPr lang="en-US" sz="1600" dirty="0">
                 <a:latin typeface="Courier New" panose="02070309020205020404" pitchFamily="49" charset="0"/>
                 <a:cs typeface="Courier New" panose="02070309020205020404" pitchFamily="49" charset="0"/>
               </a:rPr>
-              <a:t>  (use "</a:t>
-            </a:r>
-            <a:r>
-              <a:rPr lang="en-US" dirty="0" err="1">
+              <a:t>  (use "git add &lt;file&gt;..." to include in what will be committed)</a:t>
+            </a:r>
+          </a:p>
+          <a:p>
+            <a:r>
+              <a:rPr lang="en-US" sz="1600" dirty="0">
                 <a:latin typeface="Courier New" panose="02070309020205020404" pitchFamily="49" charset="0"/>
                 <a:cs typeface="Courier New" panose="02070309020205020404" pitchFamily="49" charset="0"/>
               </a:rPr>
-              <a:t>git</a:t>
-            </a:r>
-            <a:r>
-              <a:rPr lang="en-US" dirty="0">
-                <a:latin typeface="Courier New" panose="02070309020205020404" pitchFamily="49" charset="0"/>
-                <a:cs typeface="Courier New" panose="02070309020205020404" pitchFamily="49" charset="0"/>
-              </a:rPr>
-              <a:t> add &lt;file&gt;..." to include in what</a:t>
-            </a:r>
-            <a:br>
-              <a:rPr lang="en-US" dirty="0">
-                <a:latin typeface="Courier New" panose="02070309020205020404" pitchFamily="49" charset="0"/>
-                <a:cs typeface="Courier New" panose="02070309020205020404" pitchFamily="49" charset="0"/>
-              </a:rPr>
-            </a:br>
-            <a:r>
-              <a:rPr lang="en-US" dirty="0">
-                <a:latin typeface="Courier New" panose="02070309020205020404" pitchFamily="49" charset="0"/>
-                <a:cs typeface="Courier New" panose="02070309020205020404" pitchFamily="49" charset="0"/>
-              </a:rPr>
-              <a:t>   will be committed)</a:t>
-            </a:r>
-          </a:p>
-          <a:p>
-            <a:r>
-              <a:rPr lang="en-US" dirty="0">
-                <a:latin typeface="Courier New" panose="02070309020205020404" pitchFamily="49" charset="0"/>
-                <a:cs typeface="Courier New" panose="02070309020205020404" pitchFamily="49" charset="0"/>
-              </a:rPr>
-              <a:t>	TODO.md</a:t>
+              <a:t>        data.txt</a:t>
             </a:r>
           </a:p>
         </p:txBody>
@@ -13529,7 +13493,7 @@
         <p:spPr/>
         <p:txBody>
           <a:bodyPr>
-            <a:normAutofit/>
+            <a:normAutofit fontScale="85000" lnSpcReduction="20000"/>
           </a:bodyPr>
           <a:lstStyle/>
           <a:p>
@@ -13636,6 +13600,26 @@
             <a:r>
               <a:rPr lang="en-US" i="1" dirty="0"/>
               <a:t>how</a:t>
+            </a:r>
+          </a:p>
+          <a:p>
+            <a:pPr marL="571500" indent="-514350"/>
+            <a:r>
+              <a:rPr lang="en-US" i="1" dirty="0"/>
+              <a:t>And how not to write commit messages</a:t>
+            </a:r>
+            <a:br>
+              <a:rPr lang="en-US" i="1" dirty="0"/>
+            </a:br>
+            <a:r>
+              <a:rPr lang="en-US" i="1" dirty="0">
+                <a:hlinkClick r:id="rId3"/>
+              </a:rPr>
+              <a:t>https://javascript.plainenglish.io/50-hilarious-git-commit-messages-597537764bbe</a:t>
+            </a:r>
+            <a:r>
+              <a:rPr lang="en-US" i="1" dirty="0"/>
+              <a:t> </a:t>
             </a:r>
           </a:p>
           <a:p>
@@ -21851,14 +21835,14 @@
                 <a:latin typeface="Courier New" pitchFamily="49" charset="0"/>
                 <a:cs typeface="Courier New" pitchFamily="49" charset="0"/>
               </a:rPr>
-              <a:t>checkout</a:t>
+              <a:t>restore</a:t>
             </a:r>
             <a:r>
               <a:rPr lang="nl-BE" dirty="0">
                 <a:latin typeface="Courier New" pitchFamily="49" charset="0"/>
                 <a:cs typeface="Courier New" pitchFamily="49" charset="0"/>
               </a:rPr>
-              <a:t>  --  </a:t>
+              <a:t>  </a:t>
             </a:r>
             <a:r>
               <a:rPr lang="nl-BE" dirty="0" err="1">

</xml_diff>

<commit_message>
Replace reset by restore to unstage
</commit_message>
<xml_diff>
--- a/version_control_git.pptx
+++ b/version_control_git.pptx
@@ -406,7 +406,7 @@
           <a:p>
             <a:fld id="{11D3E7B2-0861-45F0-B59E-BA867D5C805D}" type="datetimeFigureOut">
               <a:rPr lang="nl-BE" smtClean="0"/>
-              <a:t>7/11/2022</a:t>
+              <a:t>29/03/2023</a:t>
             </a:fld>
             <a:endParaRPr lang="nl-BE"/>
           </a:p>
@@ -1107,7 +1107,7 @@
           <a:p>
             <a:fld id="{208C4982-2142-4DAC-808C-52C1A6ABA40A}" type="datetime1">
               <a:rPr lang="nl-BE" smtClean="0"/>
-              <a:t>7/11/2022</a:t>
+              <a:t>29/03/2023</a:t>
             </a:fld>
             <a:endParaRPr lang="nl-BE"/>
           </a:p>
@@ -1277,7 +1277,7 @@
           <a:p>
             <a:fld id="{596A4774-AA95-4CEA-9215-BE91EC5FD3A2}" type="datetime1">
               <a:rPr lang="nl-BE" smtClean="0"/>
-              <a:t>7/11/2022</a:t>
+              <a:t>29/03/2023</a:t>
             </a:fld>
             <a:endParaRPr lang="nl-BE"/>
           </a:p>
@@ -1457,7 +1457,7 @@
           <a:p>
             <a:fld id="{E3C938DE-9D5A-4A9D-B2A9-9053FBBA636A}" type="datetime1">
               <a:rPr lang="nl-BE" smtClean="0"/>
-              <a:t>7/11/2022</a:t>
+              <a:t>29/03/2023</a:t>
             </a:fld>
             <a:endParaRPr lang="nl-BE"/>
           </a:p>
@@ -1627,7 +1627,7 @@
           <a:p>
             <a:fld id="{70B73439-F632-4142-A813-39A8890A9414}" type="datetime1">
               <a:rPr lang="nl-BE" smtClean="0"/>
-              <a:t>7/11/2022</a:t>
+              <a:t>29/03/2023</a:t>
             </a:fld>
             <a:endParaRPr lang="nl-BE"/>
           </a:p>
@@ -1873,7 +1873,7 @@
           <a:p>
             <a:fld id="{2DA105E3-7574-4472-893A-A0C7A919BAE6}" type="datetime1">
               <a:rPr lang="nl-BE" smtClean="0"/>
-              <a:t>7/11/2022</a:t>
+              <a:t>29/03/2023</a:t>
             </a:fld>
             <a:endParaRPr lang="nl-BE"/>
           </a:p>
@@ -2161,7 +2161,7 @@
           <a:p>
             <a:fld id="{184B200F-AF61-4171-AE34-7A4B12E0FBA3}" type="datetime1">
               <a:rPr lang="nl-BE" smtClean="0"/>
-              <a:t>7/11/2022</a:t>
+              <a:t>29/03/2023</a:t>
             </a:fld>
             <a:endParaRPr lang="nl-BE"/>
           </a:p>
@@ -2583,7 +2583,7 @@
           <a:p>
             <a:fld id="{4DDD3743-DAF8-4465-AEC2-93735E02B3D0}" type="datetime1">
               <a:rPr lang="nl-BE" smtClean="0"/>
-              <a:t>7/11/2022</a:t>
+              <a:t>29/03/2023</a:t>
             </a:fld>
             <a:endParaRPr lang="nl-BE"/>
           </a:p>
@@ -2701,7 +2701,7 @@
           <a:p>
             <a:fld id="{0E48E2E9-C147-459B-ACCB-D6DDC51735D3}" type="datetime1">
               <a:rPr lang="nl-BE" smtClean="0"/>
-              <a:t>7/11/2022</a:t>
+              <a:t>29/03/2023</a:t>
             </a:fld>
             <a:endParaRPr lang="nl-BE"/>
           </a:p>
@@ -2796,7 +2796,7 @@
           <a:p>
             <a:fld id="{C92A24F5-0967-4B11-849A-0009476290B5}" type="datetime1">
               <a:rPr lang="nl-BE" smtClean="0"/>
-              <a:t>7/11/2022</a:t>
+              <a:t>29/03/2023</a:t>
             </a:fld>
             <a:endParaRPr lang="nl-BE"/>
           </a:p>
@@ -3073,7 +3073,7 @@
           <a:p>
             <a:fld id="{CAAB6B0C-E333-4316-A6EC-161EFC5CB4BD}" type="datetime1">
               <a:rPr lang="nl-BE" smtClean="0"/>
-              <a:t>7/11/2022</a:t>
+              <a:t>29/03/2023</a:t>
             </a:fld>
             <a:endParaRPr lang="nl-BE"/>
           </a:p>
@@ -3326,7 +3326,7 @@
           <a:p>
             <a:fld id="{5AC2428B-24E8-4004-8AB4-EA69DDAD1475}" type="datetime1">
               <a:rPr lang="nl-BE" smtClean="0"/>
-              <a:t>7/11/2022</a:t>
+              <a:t>29/03/2023</a:t>
             </a:fld>
             <a:endParaRPr lang="nl-BE"/>
           </a:p>
@@ -3539,7 +3539,7 @@
           <a:p>
             <a:fld id="{063E4CA3-87AF-44C9-B256-93720A95DFC3}" type="datetime1">
               <a:rPr lang="nl-BE" smtClean="0"/>
-              <a:t>7/11/2022</a:t>
+              <a:t>29/03/2023</a:t>
             </a:fld>
             <a:endParaRPr lang="nl-BE"/>
           </a:p>
@@ -23573,7 +23573,7 @@
         <p:spPr>
           <a:xfrm>
             <a:off x="1259632" y="2649686"/>
-            <a:ext cx="3960440" cy="923330"/>
+            <a:ext cx="4464496" cy="923330"/>
           </a:xfrm>
           <a:prstGeom prst="rect">
             <a:avLst/>
@@ -23643,7 +23643,35 @@
                 <a:latin typeface="Courier New" pitchFamily="49" charset="0"/>
                 <a:cs typeface="Courier New" pitchFamily="49" charset="0"/>
               </a:rPr>
-              <a:t>$ git reset  HEAD  </a:t>
+              <a:t>$ git </a:t>
+            </a:r>
+            <a:r>
+              <a:rPr lang="nl-BE" dirty="0" err="1">
+                <a:latin typeface="Courier New" pitchFamily="49" charset="0"/>
+                <a:cs typeface="Courier New" pitchFamily="49" charset="0"/>
+              </a:rPr>
+              <a:t>restore</a:t>
+            </a:r>
+            <a:r>
+              <a:rPr lang="nl-BE" dirty="0">
+                <a:latin typeface="Courier New" pitchFamily="49" charset="0"/>
+                <a:cs typeface="Courier New" pitchFamily="49" charset="0"/>
+              </a:rPr>
+              <a:t>  --</a:t>
+            </a:r>
+            <a:r>
+              <a:rPr lang="nl-BE" dirty="0" err="1">
+                <a:latin typeface="Courier New" pitchFamily="49" charset="0"/>
+                <a:cs typeface="Courier New" pitchFamily="49" charset="0"/>
+              </a:rPr>
+              <a:t>staged</a:t>
+            </a:r>
+            <a:r>
+              <a:rPr lang="nl-BE" dirty="0">
+                <a:latin typeface="Courier New" pitchFamily="49" charset="0"/>
+                <a:cs typeface="Courier New" pitchFamily="49" charset="0"/>
+              </a:rPr>
+              <a:t>  </a:t>
             </a:r>
             <a:r>
               <a:rPr lang="nl-BE" dirty="0" err="1">
@@ -23668,7 +23696,7 @@
         <p:spPr>
           <a:xfrm>
             <a:off x="1259632" y="4941168"/>
-            <a:ext cx="3960440" cy="369332"/>
+            <a:ext cx="4464496" cy="369332"/>
           </a:xfrm>
           <a:prstGeom prst="rect">
             <a:avLst/>
@@ -23752,8 +23780,8 @@
         </p:nvSpPr>
         <p:spPr>
           <a:xfrm>
-            <a:off x="1231719" y="6075144"/>
-            <a:ext cx="3960440" cy="646331"/>
+            <a:off x="1231718" y="6075144"/>
+            <a:ext cx="4492409" cy="646331"/>
           </a:xfrm>
           <a:prstGeom prst="rect">
             <a:avLst/>
@@ -24272,7 +24300,7 @@
         <p:spPr>
           <a:xfrm>
             <a:off x="1187624" y="3933056"/>
-            <a:ext cx="3960440" cy="369332"/>
+            <a:ext cx="5112568" cy="369332"/>
           </a:xfrm>
           <a:prstGeom prst="rect">
             <a:avLst/>
@@ -24309,7 +24337,7 @@
         <p:spPr>
           <a:xfrm>
             <a:off x="1187624" y="2152629"/>
-            <a:ext cx="3960440" cy="1200329"/>
+            <a:ext cx="5112568" cy="1200329"/>
           </a:xfrm>
           <a:prstGeom prst="rect">
             <a:avLst/>
@@ -24341,7 +24369,35 @@
                 <a:latin typeface="Courier New" pitchFamily="49" charset="0"/>
                 <a:cs typeface="Courier New" pitchFamily="49" charset="0"/>
               </a:rPr>
-              <a:t>$ git reset  HEAD  appl.exe</a:t>
+              <a:t>$ git </a:t>
+            </a:r>
+            <a:r>
+              <a:rPr lang="nl-BE" dirty="0" err="1">
+                <a:latin typeface="Courier New" pitchFamily="49" charset="0"/>
+                <a:cs typeface="Courier New" pitchFamily="49" charset="0"/>
+              </a:rPr>
+              <a:t>restore</a:t>
+            </a:r>
+            <a:r>
+              <a:rPr lang="nl-BE" dirty="0">
+                <a:latin typeface="Courier New" pitchFamily="49" charset="0"/>
+                <a:cs typeface="Courier New" pitchFamily="49" charset="0"/>
+              </a:rPr>
+              <a:t>  --</a:t>
+            </a:r>
+            <a:r>
+              <a:rPr lang="nl-BE" dirty="0" err="1">
+                <a:latin typeface="Courier New" pitchFamily="49" charset="0"/>
+                <a:cs typeface="Courier New" pitchFamily="49" charset="0"/>
+              </a:rPr>
+              <a:t>staged</a:t>
+            </a:r>
+            <a:r>
+              <a:rPr lang="nl-BE" dirty="0">
+                <a:latin typeface="Courier New" pitchFamily="49" charset="0"/>
+                <a:cs typeface="Courier New" pitchFamily="49" charset="0"/>
+              </a:rPr>
+              <a:t>   appl.exe</a:t>
             </a:r>
           </a:p>
           <a:p>

</xml_diff>

<commit_message>
Fix mistake in git config calls
</commit_message>
<xml_diff>
--- a/version_control_git.pptx
+++ b/version_control_git.pptx
@@ -406,7 +406,7 @@
           <a:p>
             <a:fld id="{11D3E7B2-0861-45F0-B59E-BA867D5C805D}" type="datetimeFigureOut">
               <a:rPr lang="nl-BE" smtClean="0"/>
-              <a:t>29/03/2023</a:t>
+              <a:t>23/06/2023</a:t>
             </a:fld>
             <a:endParaRPr lang="nl-BE"/>
           </a:p>
@@ -1107,7 +1107,7 @@
           <a:p>
             <a:fld id="{208C4982-2142-4DAC-808C-52C1A6ABA40A}" type="datetime1">
               <a:rPr lang="nl-BE" smtClean="0"/>
-              <a:t>29/03/2023</a:t>
+              <a:t>23/06/2023</a:t>
             </a:fld>
             <a:endParaRPr lang="nl-BE"/>
           </a:p>
@@ -1277,7 +1277,7 @@
           <a:p>
             <a:fld id="{596A4774-AA95-4CEA-9215-BE91EC5FD3A2}" type="datetime1">
               <a:rPr lang="nl-BE" smtClean="0"/>
-              <a:t>29/03/2023</a:t>
+              <a:t>23/06/2023</a:t>
             </a:fld>
             <a:endParaRPr lang="nl-BE"/>
           </a:p>
@@ -1457,7 +1457,7 @@
           <a:p>
             <a:fld id="{E3C938DE-9D5A-4A9D-B2A9-9053FBBA636A}" type="datetime1">
               <a:rPr lang="nl-BE" smtClean="0"/>
-              <a:t>29/03/2023</a:t>
+              <a:t>23/06/2023</a:t>
             </a:fld>
             <a:endParaRPr lang="nl-BE"/>
           </a:p>
@@ -1627,7 +1627,7 @@
           <a:p>
             <a:fld id="{70B73439-F632-4142-A813-39A8890A9414}" type="datetime1">
               <a:rPr lang="nl-BE" smtClean="0"/>
-              <a:t>29/03/2023</a:t>
+              <a:t>23/06/2023</a:t>
             </a:fld>
             <a:endParaRPr lang="nl-BE"/>
           </a:p>
@@ -1873,7 +1873,7 @@
           <a:p>
             <a:fld id="{2DA105E3-7574-4472-893A-A0C7A919BAE6}" type="datetime1">
               <a:rPr lang="nl-BE" smtClean="0"/>
-              <a:t>29/03/2023</a:t>
+              <a:t>23/06/2023</a:t>
             </a:fld>
             <a:endParaRPr lang="nl-BE"/>
           </a:p>
@@ -2161,7 +2161,7 @@
           <a:p>
             <a:fld id="{184B200F-AF61-4171-AE34-7A4B12E0FBA3}" type="datetime1">
               <a:rPr lang="nl-BE" smtClean="0"/>
-              <a:t>29/03/2023</a:t>
+              <a:t>23/06/2023</a:t>
             </a:fld>
             <a:endParaRPr lang="nl-BE"/>
           </a:p>
@@ -2583,7 +2583,7 @@
           <a:p>
             <a:fld id="{4DDD3743-DAF8-4465-AEC2-93735E02B3D0}" type="datetime1">
               <a:rPr lang="nl-BE" smtClean="0"/>
-              <a:t>29/03/2023</a:t>
+              <a:t>23/06/2023</a:t>
             </a:fld>
             <a:endParaRPr lang="nl-BE"/>
           </a:p>
@@ -2701,7 +2701,7 @@
           <a:p>
             <a:fld id="{0E48E2E9-C147-459B-ACCB-D6DDC51735D3}" type="datetime1">
               <a:rPr lang="nl-BE" smtClean="0"/>
-              <a:t>29/03/2023</a:t>
+              <a:t>23/06/2023</a:t>
             </a:fld>
             <a:endParaRPr lang="nl-BE"/>
           </a:p>
@@ -2796,7 +2796,7 @@
           <a:p>
             <a:fld id="{C92A24F5-0967-4B11-849A-0009476290B5}" type="datetime1">
               <a:rPr lang="nl-BE" smtClean="0"/>
-              <a:t>29/03/2023</a:t>
+              <a:t>23/06/2023</a:t>
             </a:fld>
             <a:endParaRPr lang="nl-BE"/>
           </a:p>
@@ -3073,7 +3073,7 @@
           <a:p>
             <a:fld id="{CAAB6B0C-E333-4316-A6EC-161EFC5CB4BD}" type="datetime1">
               <a:rPr lang="nl-BE" smtClean="0"/>
-              <a:t>29/03/2023</a:t>
+              <a:t>23/06/2023</a:t>
             </a:fld>
             <a:endParaRPr lang="nl-BE"/>
           </a:p>
@@ -3326,7 +3326,7 @@
           <a:p>
             <a:fld id="{5AC2428B-24E8-4004-8AB4-EA69DDAD1475}" type="datetime1">
               <a:rPr lang="nl-BE" smtClean="0"/>
-              <a:t>29/03/2023</a:t>
+              <a:t>23/06/2023</a:t>
             </a:fld>
             <a:endParaRPr lang="nl-BE"/>
           </a:p>
@@ -3539,7 +3539,7 @@
           <a:p>
             <a:fld id="{063E4CA3-87AF-44C9-B256-93720A95DFC3}" type="datetime1">
               <a:rPr lang="nl-BE" smtClean="0"/>
-              <a:t>29/03/2023</a:t>
+              <a:t>23/06/2023</a:t>
             </a:fld>
             <a:endParaRPr lang="nl-BE"/>
           </a:p>
@@ -10397,7 +10397,7 @@
                 <a:latin typeface="Courier New" pitchFamily="49" charset="0"/>
                 <a:cs typeface="Courier New" pitchFamily="49" charset="0"/>
               </a:rPr>
-              <a:t>$ git config  --global  user.name='Geert Jan Bex'</a:t>
+              <a:t>$ git config  --global  user.name 'Geert Jan Bex'</a:t>
             </a:r>
           </a:p>
         </p:txBody>
@@ -10434,7 +10434,21 @@
                 <a:latin typeface="Courier New" pitchFamily="49" charset="0"/>
                 <a:cs typeface="Courier New" pitchFamily="49" charset="0"/>
               </a:rPr>
-              <a:t>$ git config  --global  user.email='geertjan.bex@uhasselt.be'</a:t>
+              <a:t>$ git config  --global  </a:t>
+            </a:r>
+            <a:r>
+              <a:rPr lang="nl-BE" dirty="0" err="1">
+                <a:latin typeface="Courier New" pitchFamily="49" charset="0"/>
+                <a:cs typeface="Courier New" pitchFamily="49" charset="0"/>
+              </a:rPr>
+              <a:t>user.email</a:t>
+            </a:r>
+            <a:r>
+              <a:rPr lang="nl-BE" dirty="0">
+                <a:latin typeface="Courier New" pitchFamily="49" charset="0"/>
+                <a:cs typeface="Courier New" pitchFamily="49" charset="0"/>
+              </a:rPr>
+              <a:t> 'geertjan.bex@uhasselt.be'</a:t>
             </a:r>
           </a:p>
         </p:txBody>

</xml_diff>